<commit_message>
Updates to phenology figures
</commit_message>
<xml_diff>
--- a/Aim1/figures/Phenology_Arrange.pptx
+++ b/Aim1/figures/Phenology_Arrange.pptx
@@ -5,8 +5,7 @@
     <p:sldMasterId id="2147483660" r:id="rId1"/>
   </p:sldMasterIdLst>
   <p:sldIdLst>
-    <p:sldId id="256" r:id="rId2"/>
-    <p:sldId id="257" r:id="rId3"/>
+    <p:sldId id="257" r:id="rId2"/>
   </p:sldIdLst>
   <p:sldSz cx="6858000" cy="8229600"/>
   <p:notesSz cx="6858000" cy="9144000"/>
@@ -105,15 +104,96 @@
       </a:defRPr>
     </a:lvl9pPr>
   </p:defaultTextStyle>
+  <p:extLst>
+    <p:ext uri="{EFAFB233-063F-42B5-8137-9DF3F51BA10A}">
+      <p15:sldGuideLst xmlns:p15="http://schemas.microsoft.com/office/powerpoint/2012/main"/>
+    </p:ext>
+  </p:extLst>
 </p:presentation>
 </file>
 
 <file path=ppt/revisionInfo.xml><?xml version="1.0" encoding="utf-8"?>
 <p1510:revInfo xmlns:a="http://schemas.openxmlformats.org/drawingml/2006/main" xmlns:r="http://schemas.openxmlformats.org/officeDocument/2006/relationships" xmlns:p1510="http://schemas.microsoft.com/office/powerpoint/2015/10/main">
   <p1510:revLst>
-    <p1510:client id="{2F5ABE80-5F8E-A249-9848-010A88611A94}" v="2" dt="2024-02-22T21:13:50.046"/>
+    <p1510:client id="{2F5ABE80-5F8E-A249-9848-010A88611A94}" v="5" dt="2024-02-23T20:56:43.775"/>
   </p1510:revLst>
 </p1510:revInfo>
+</file>
+
+<file path=ppt/changesInfos/changesInfo1.xml><?xml version="1.0" encoding="utf-8"?>
+<pc:chgInfo xmlns:a="http://schemas.openxmlformats.org/drawingml/2006/main" xmlns:r="http://schemas.openxmlformats.org/officeDocument/2006/relationships" xmlns:ac="http://schemas.microsoft.com/office/drawing/2013/main/command" xmlns:pc="http://schemas.microsoft.com/office/powerpoint/2013/main/command">
+  <pc:docChgLst>
+    <pc:chgData name="Maxwell Cook" userId="6270a8f4b8f62cae" providerId="LiveId" clId="{2F5ABE80-5F8E-A249-9848-010A88611A94}"/>
+    <pc:docChg chg="undo custSel delSld modSld">
+      <pc:chgData name="Maxwell Cook" userId="6270a8f4b8f62cae" providerId="LiveId" clId="{2F5ABE80-5F8E-A249-9848-010A88611A94}" dt="2024-02-23T20:57:01.557" v="7" actId="1076"/>
+      <pc:docMkLst>
+        <pc:docMk/>
+      </pc:docMkLst>
+      <pc:sldChg chg="del">
+        <pc:chgData name="Maxwell Cook" userId="6270a8f4b8f62cae" providerId="LiveId" clId="{2F5ABE80-5F8E-A249-9848-010A88611A94}" dt="2024-02-23T20:45:38.728" v="0" actId="2696"/>
+        <pc:sldMkLst>
+          <pc:docMk/>
+          <pc:sldMk cId="3862522556" sldId="256"/>
+        </pc:sldMkLst>
+      </pc:sldChg>
+      <pc:sldChg chg="addSp delSp modSp mod">
+        <pc:chgData name="Maxwell Cook" userId="6270a8f4b8f62cae" providerId="LiveId" clId="{2F5ABE80-5F8E-A249-9848-010A88611A94}" dt="2024-02-23T20:57:01.557" v="7" actId="1076"/>
+        <pc:sldMkLst>
+          <pc:docMk/>
+          <pc:sldMk cId="930149706" sldId="257"/>
+        </pc:sldMkLst>
+        <pc:grpChg chg="mod">
+          <ac:chgData name="Maxwell Cook" userId="6270a8f4b8f62cae" providerId="LiveId" clId="{2F5ABE80-5F8E-A249-9848-010A88611A94}" dt="2024-02-23T20:56:43.775" v="5" actId="14826"/>
+          <ac:grpSpMkLst>
+            <pc:docMk/>
+            <pc:sldMk cId="930149706" sldId="257"/>
+            <ac:grpSpMk id="20" creationId="{2781E1EF-5A46-2DB2-1F24-04B73E582A64}"/>
+          </ac:grpSpMkLst>
+        </pc:grpChg>
+        <pc:picChg chg="add del mod">
+          <ac:chgData name="Maxwell Cook" userId="6270a8f4b8f62cae" providerId="LiveId" clId="{2F5ABE80-5F8E-A249-9848-010A88611A94}" dt="2024-02-23T20:57:01.557" v="7" actId="1076"/>
+          <ac:picMkLst>
+            <pc:docMk/>
+            <pc:sldMk cId="930149706" sldId="257"/>
+            <ac:picMk id="11" creationId="{0ABDCDBB-E9A7-9BAF-C770-AD17E897E717}"/>
+          </ac:picMkLst>
+        </pc:picChg>
+        <pc:picChg chg="mod">
+          <ac:chgData name="Maxwell Cook" userId="6270a8f4b8f62cae" providerId="LiveId" clId="{2F5ABE80-5F8E-A249-9848-010A88611A94}" dt="2024-02-23T20:56:43.775" v="5" actId="14826"/>
+          <ac:picMkLst>
+            <pc:docMk/>
+            <pc:sldMk cId="930149706" sldId="257"/>
+            <ac:picMk id="13" creationId="{1D3A1C75-DC5D-BF60-55F1-3579388DEA79}"/>
+          </ac:picMkLst>
+        </pc:picChg>
+        <pc:picChg chg="mod">
+          <ac:chgData name="Maxwell Cook" userId="6270a8f4b8f62cae" providerId="LiveId" clId="{2F5ABE80-5F8E-A249-9848-010A88611A94}" dt="2024-02-23T20:56:43.775" v="5" actId="14826"/>
+          <ac:picMkLst>
+            <pc:docMk/>
+            <pc:sldMk cId="930149706" sldId="257"/>
+            <ac:picMk id="15" creationId="{B7AE8958-FF87-1AAB-5CD1-3E982DDF12DB}"/>
+          </ac:picMkLst>
+        </pc:picChg>
+        <pc:picChg chg="mod">
+          <ac:chgData name="Maxwell Cook" userId="6270a8f4b8f62cae" providerId="LiveId" clId="{2F5ABE80-5F8E-A249-9848-010A88611A94}" dt="2024-02-23T20:56:43.775" v="5" actId="14826"/>
+          <ac:picMkLst>
+            <pc:docMk/>
+            <pc:sldMk cId="930149706" sldId="257"/>
+            <ac:picMk id="17" creationId="{1CBF3742-CBA3-644A-E35F-529117847C04}"/>
+          </ac:picMkLst>
+        </pc:picChg>
+        <pc:picChg chg="mod">
+          <ac:chgData name="Maxwell Cook" userId="6270a8f4b8f62cae" providerId="LiveId" clId="{2F5ABE80-5F8E-A249-9848-010A88611A94}" dt="2024-02-23T20:56:43.775" v="5" actId="14826"/>
+          <ac:picMkLst>
+            <pc:docMk/>
+            <pc:sldMk cId="930149706" sldId="257"/>
+            <ac:picMk id="19" creationId="{DC476CB4-CAB6-9016-E266-B3C7CBF073BC}"/>
+          </ac:picMkLst>
+        </pc:picChg>
+      </pc:sldChg>
+    </pc:docChg>
+  </pc:docChgLst>
+</pc:chgInfo>
 </file>
 
 <file path=ppt/slideLayouts/slideLayout1.xml><?xml version="1.0" encoding="utf-8"?>
@@ -247,7 +327,7 @@
           <a:p>
             <a:fld id="{550269F3-9D86-1F48-922E-656029CE8542}" type="datetimeFigureOut">
               <a:rPr lang="en-US" smtClean="0"/>
-              <a:t>2/22/24</a:t>
+              <a:t>2/23/24</a:t>
             </a:fld>
             <a:endParaRPr lang="en-US"/>
           </a:p>
@@ -417,7 +497,7 @@
           <a:p>
             <a:fld id="{550269F3-9D86-1F48-922E-656029CE8542}" type="datetimeFigureOut">
               <a:rPr lang="en-US" smtClean="0"/>
-              <a:t>2/22/24</a:t>
+              <a:t>2/23/24</a:t>
             </a:fld>
             <a:endParaRPr lang="en-US"/>
           </a:p>
@@ -597,7 +677,7 @@
           <a:p>
             <a:fld id="{550269F3-9D86-1F48-922E-656029CE8542}" type="datetimeFigureOut">
               <a:rPr lang="en-US" smtClean="0"/>
-              <a:t>2/22/24</a:t>
+              <a:t>2/23/24</a:t>
             </a:fld>
             <a:endParaRPr lang="en-US"/>
           </a:p>
@@ -767,7 +847,7 @@
           <a:p>
             <a:fld id="{550269F3-9D86-1F48-922E-656029CE8542}" type="datetimeFigureOut">
               <a:rPr lang="en-US" smtClean="0"/>
-              <a:t>2/22/24</a:t>
+              <a:t>2/23/24</a:t>
             </a:fld>
             <a:endParaRPr lang="en-US"/>
           </a:p>
@@ -1013,7 +1093,7 @@
           <a:p>
             <a:fld id="{550269F3-9D86-1F48-922E-656029CE8542}" type="datetimeFigureOut">
               <a:rPr lang="en-US" smtClean="0"/>
-              <a:t>2/22/24</a:t>
+              <a:t>2/23/24</a:t>
             </a:fld>
             <a:endParaRPr lang="en-US"/>
           </a:p>
@@ -1245,7 +1325,7 @@
           <a:p>
             <a:fld id="{550269F3-9D86-1F48-922E-656029CE8542}" type="datetimeFigureOut">
               <a:rPr lang="en-US" smtClean="0"/>
-              <a:t>2/22/24</a:t>
+              <a:t>2/23/24</a:t>
             </a:fld>
             <a:endParaRPr lang="en-US"/>
           </a:p>
@@ -1612,7 +1692,7 @@
           <a:p>
             <a:fld id="{550269F3-9D86-1F48-922E-656029CE8542}" type="datetimeFigureOut">
               <a:rPr lang="en-US" smtClean="0"/>
-              <a:t>2/22/24</a:t>
+              <a:t>2/23/24</a:t>
             </a:fld>
             <a:endParaRPr lang="en-US"/>
           </a:p>
@@ -1730,7 +1810,7 @@
           <a:p>
             <a:fld id="{550269F3-9D86-1F48-922E-656029CE8542}" type="datetimeFigureOut">
               <a:rPr lang="en-US" smtClean="0"/>
-              <a:t>2/22/24</a:t>
+              <a:t>2/23/24</a:t>
             </a:fld>
             <a:endParaRPr lang="en-US"/>
           </a:p>
@@ -1825,7 +1905,7 @@
           <a:p>
             <a:fld id="{550269F3-9D86-1F48-922E-656029CE8542}" type="datetimeFigureOut">
               <a:rPr lang="en-US" smtClean="0"/>
-              <a:t>2/22/24</a:t>
+              <a:t>2/23/24</a:t>
             </a:fld>
             <a:endParaRPr lang="en-US"/>
           </a:p>
@@ -2102,7 +2182,7 @@
           <a:p>
             <a:fld id="{550269F3-9D86-1F48-922E-656029CE8542}" type="datetimeFigureOut">
               <a:rPr lang="en-US" smtClean="0"/>
-              <a:t>2/22/24</a:t>
+              <a:t>2/23/24</a:t>
             </a:fld>
             <a:endParaRPr lang="en-US"/>
           </a:p>
@@ -2359,7 +2439,7 @@
           <a:p>
             <a:fld id="{550269F3-9D86-1F48-922E-656029CE8542}" type="datetimeFigureOut">
               <a:rPr lang="en-US" smtClean="0"/>
-              <a:t>2/22/24</a:t>
+              <a:t>2/23/24</a:t>
             </a:fld>
             <a:endParaRPr lang="en-US"/>
           </a:p>
@@ -2572,7 +2652,7 @@
           <a:p>
             <a:fld id="{550269F3-9D86-1F48-922E-656029CE8542}" type="datetimeFigureOut">
               <a:rPr lang="en-US" smtClean="0"/>
-              <a:t>2/22/24</a:t>
+              <a:t>2/23/24</a:t>
             </a:fld>
             <a:endParaRPr lang="en-US"/>
           </a:p>
@@ -2977,96 +3057,6 @@
           <a:chExt cx="0" cy="0"/>
         </a:xfrm>
       </p:grpSpPr>
-      <p:pic>
-        <p:nvPicPr>
-          <p:cNvPr id="7" name="Picture 6" descr="A green pixelated map&#10;&#10;Description automatically generated">
-            <a:extLst>
-              <a:ext uri="{FF2B5EF4-FFF2-40B4-BE49-F238E27FC236}">
-                <a16:creationId xmlns:a16="http://schemas.microsoft.com/office/drawing/2014/main" id="{33EB43F3-27EC-DD48-20A4-96FCE1E5BADB}"/>
-              </a:ext>
-            </a:extLst>
-          </p:cNvPr>
-          <p:cNvPicPr>
-            <a:picLocks noChangeAspect="1"/>
-          </p:cNvPicPr>
-          <p:nvPr/>
-        </p:nvPicPr>
-        <p:blipFill>
-          <a:blip r:embed="rId2"/>
-          <a:stretch>
-            <a:fillRect/>
-          </a:stretch>
-        </p:blipFill>
-        <p:spPr>
-          <a:xfrm>
-            <a:off x="228600" y="914400"/>
-            <a:ext cx="6400800" cy="6400800"/>
-          </a:xfrm>
-          <a:prstGeom prst="rect">
-            <a:avLst/>
-          </a:prstGeom>
-        </p:spPr>
-      </p:pic>
-      <p:pic>
-        <p:nvPicPr>
-          <p:cNvPr id="17" name="Picture 16" descr="A graph with black dots&#10;&#10;Description automatically generated">
-            <a:extLst>
-              <a:ext uri="{FF2B5EF4-FFF2-40B4-BE49-F238E27FC236}">
-                <a16:creationId xmlns:a16="http://schemas.microsoft.com/office/drawing/2014/main" id="{BD211443-877B-542D-0C2F-9D7FA163D09E}"/>
-              </a:ext>
-            </a:extLst>
-          </p:cNvPr>
-          <p:cNvPicPr>
-            <a:picLocks noChangeAspect="1"/>
-          </p:cNvPicPr>
-          <p:nvPr/>
-        </p:nvPicPr>
-        <p:blipFill>
-          <a:blip r:embed="rId3"/>
-          <a:stretch>
-            <a:fillRect/>
-          </a:stretch>
-        </p:blipFill>
-        <p:spPr>
-          <a:xfrm>
-            <a:off x="982639" y="1409131"/>
-            <a:ext cx="1828800" cy="1828800"/>
-          </a:xfrm>
-          <a:prstGeom prst="rect">
-            <a:avLst/>
-          </a:prstGeom>
-        </p:spPr>
-      </p:pic>
-    </p:spTree>
-    <p:extLst>
-      <p:ext uri="{BB962C8B-B14F-4D97-AF65-F5344CB8AC3E}">
-        <p14:creationId xmlns:p14="http://schemas.microsoft.com/office/powerpoint/2010/main" val="3862522556"/>
-      </p:ext>
-    </p:extLst>
-  </p:cSld>
-  <p:clrMapOvr>
-    <a:masterClrMapping/>
-  </p:clrMapOvr>
-</p:sld>
-</file>
-
-<file path=ppt/slides/slide2.xml><?xml version="1.0" encoding="utf-8"?>
-<p:sld xmlns:a="http://schemas.openxmlformats.org/drawingml/2006/main" xmlns:r="http://schemas.openxmlformats.org/officeDocument/2006/relationships" xmlns:p="http://schemas.openxmlformats.org/presentationml/2006/main">
-  <p:cSld>
-    <p:spTree>
-      <p:nvGrpSpPr>
-        <p:cNvPr id="1" name=""/>
-        <p:cNvGrpSpPr/>
-        <p:nvPr/>
-      </p:nvGrpSpPr>
-      <p:grpSpPr>
-        <a:xfrm>
-          <a:off x="0" y="0"/>
-          <a:ext cx="0" cy="0"/>
-          <a:chOff x="0" y="0"/>
-          <a:chExt cx="0" cy="0"/>
-        </a:xfrm>
-      </p:grpSpPr>
       <p:grpSp>
         <p:nvGrpSpPr>
           <p:cNvPr id="20" name="Group 19">
@@ -3081,10 +3071,10 @@
         </p:nvGrpSpPr>
         <p:grpSpPr>
           <a:xfrm>
-            <a:off x="330130" y="0"/>
-            <a:ext cx="6172270" cy="5930900"/>
-            <a:chOff x="330130" y="0"/>
-            <a:chExt cx="6172270" cy="5930900"/>
+            <a:off x="292100" y="59268"/>
+            <a:ext cx="6273799" cy="5824780"/>
+            <a:chOff x="292100" y="59268"/>
+            <a:chExt cx="6273799" cy="5824780"/>
           </a:xfrm>
         </p:grpSpPr>
         <p:pic>
@@ -3108,8 +3098,8 @@
           </p:blipFill>
           <p:spPr>
             <a:xfrm>
-              <a:off x="342900" y="0"/>
-              <a:ext cx="6159500" cy="5930900"/>
+              <a:off x="292100" y="59268"/>
+              <a:ext cx="6273799" cy="5824780"/>
             </a:xfrm>
             <a:prstGeom prst="rect">
               <a:avLst/>

</xml_diff>